<commit_message>
Szenarienplots und Folien aktualisiert
</commit_message>
<xml_diff>
--- a/Organisatorisches/messfehlerfolien.pptx
+++ b/Organisatorisches/messfehlerfolien.pptx
@@ -10,7 +10,8 @@
     <p:sldId id="258" r:id="rId4"/>
     <p:sldId id="259" r:id="rId5"/>
     <p:sldId id="260" r:id="rId6"/>
-    <p:sldId id="261" r:id="rId7"/>
+    <p:sldId id="262" r:id="rId7"/>
+    <p:sldId id="261" r:id="rId8"/>
   </p:sldIdLst>
   <p:sldSz cx="9144000" cy="6858000" type="screen4x3"/>
   <p:notesSz cx="6858000" cy="9144000"/>
@@ -293,7 +294,7 @@
           <a:p>
             <a:fld id="{81A98D77-E3DE-4A84-BF14-249A5C4446C9}" type="datetimeFigureOut">
               <a:rPr lang="de-DE" smtClean="0"/>
-              <a:t>09.05.2020</a:t>
+              <a:t>14.05.2020</a:t>
             </a:fld>
             <a:endParaRPr lang="de-DE"/>
           </a:p>
@@ -463,7 +464,7 @@
           <a:p>
             <a:fld id="{81A98D77-E3DE-4A84-BF14-249A5C4446C9}" type="datetimeFigureOut">
               <a:rPr lang="de-DE" smtClean="0"/>
-              <a:t>09.05.2020</a:t>
+              <a:t>14.05.2020</a:t>
             </a:fld>
             <a:endParaRPr lang="de-DE"/>
           </a:p>
@@ -643,7 +644,7 @@
           <a:p>
             <a:fld id="{81A98D77-E3DE-4A84-BF14-249A5C4446C9}" type="datetimeFigureOut">
               <a:rPr lang="de-DE" smtClean="0"/>
-              <a:t>09.05.2020</a:t>
+              <a:t>14.05.2020</a:t>
             </a:fld>
             <a:endParaRPr lang="de-DE"/>
           </a:p>
@@ -813,7 +814,7 @@
           <a:p>
             <a:fld id="{81A98D77-E3DE-4A84-BF14-249A5C4446C9}" type="datetimeFigureOut">
               <a:rPr lang="de-DE" smtClean="0"/>
-              <a:t>09.05.2020</a:t>
+              <a:t>14.05.2020</a:t>
             </a:fld>
             <a:endParaRPr lang="de-DE"/>
           </a:p>
@@ -1059,7 +1060,7 @@
           <a:p>
             <a:fld id="{81A98D77-E3DE-4A84-BF14-249A5C4446C9}" type="datetimeFigureOut">
               <a:rPr lang="de-DE" smtClean="0"/>
-              <a:t>09.05.2020</a:t>
+              <a:t>14.05.2020</a:t>
             </a:fld>
             <a:endParaRPr lang="de-DE"/>
           </a:p>
@@ -1347,7 +1348,7 @@
           <a:p>
             <a:fld id="{81A98D77-E3DE-4A84-BF14-249A5C4446C9}" type="datetimeFigureOut">
               <a:rPr lang="de-DE" smtClean="0"/>
-              <a:t>09.05.2020</a:t>
+              <a:t>14.05.2020</a:t>
             </a:fld>
             <a:endParaRPr lang="de-DE"/>
           </a:p>
@@ -1769,7 +1770,7 @@
           <a:p>
             <a:fld id="{81A98D77-E3DE-4A84-BF14-249A5C4446C9}" type="datetimeFigureOut">
               <a:rPr lang="de-DE" smtClean="0"/>
-              <a:t>09.05.2020</a:t>
+              <a:t>14.05.2020</a:t>
             </a:fld>
             <a:endParaRPr lang="de-DE"/>
           </a:p>
@@ -1887,7 +1888,7 @@
           <a:p>
             <a:fld id="{81A98D77-E3DE-4A84-BF14-249A5C4446C9}" type="datetimeFigureOut">
               <a:rPr lang="de-DE" smtClean="0"/>
-              <a:t>09.05.2020</a:t>
+              <a:t>14.05.2020</a:t>
             </a:fld>
             <a:endParaRPr lang="de-DE"/>
           </a:p>
@@ -1982,7 +1983,7 @@
           <a:p>
             <a:fld id="{81A98D77-E3DE-4A84-BF14-249A5C4446C9}" type="datetimeFigureOut">
               <a:rPr lang="de-DE" smtClean="0"/>
-              <a:t>09.05.2020</a:t>
+              <a:t>14.05.2020</a:t>
             </a:fld>
             <a:endParaRPr lang="de-DE"/>
           </a:p>
@@ -2259,7 +2260,7 @@
           <a:p>
             <a:fld id="{81A98D77-E3DE-4A84-BF14-249A5C4446C9}" type="datetimeFigureOut">
               <a:rPr lang="de-DE" smtClean="0"/>
-              <a:t>09.05.2020</a:t>
+              <a:t>14.05.2020</a:t>
             </a:fld>
             <a:endParaRPr lang="de-DE"/>
           </a:p>
@@ -2512,7 +2513,7 @@
           <a:p>
             <a:fld id="{81A98D77-E3DE-4A84-BF14-249A5C4446C9}" type="datetimeFigureOut">
               <a:rPr lang="de-DE" smtClean="0"/>
-              <a:t>09.05.2020</a:t>
+              <a:t>14.05.2020</a:t>
             </a:fld>
             <a:endParaRPr lang="de-DE"/>
           </a:p>
@@ -2725,7 +2726,7 @@
           <a:p>
             <a:fld id="{81A98D77-E3DE-4A84-BF14-249A5C4446C9}" type="datetimeFigureOut">
               <a:rPr lang="de-DE" smtClean="0"/>
-              <a:t>09.05.2020</a:t>
+              <a:t>14.05.2020</a:t>
             </a:fld>
             <a:endParaRPr lang="de-DE"/>
           </a:p>
@@ -3219,25 +3220,6 @@
               </a:solidFill>
             </a:endParaRPr>
           </a:p>
-          <a:p>
-            <a:pPr marL="342900" indent="-342900">
-              <a:buFont typeface="Arial" panose="020B0604020202020204" pitchFamily="34" charset="0"/>
-              <a:buChar char="•"/>
-            </a:pPr>
-            <a:r>
-              <a:rPr lang="de-DE" sz="2400" dirty="0" smtClean="0">
-                <a:solidFill>
-                  <a:schemeClr val="tx1"/>
-                </a:solidFill>
-              </a:rPr>
-              <a:t>Überlegung: mögliche Szenarien für Messfehler erstellen und mögliche Änderungen im Modell prüfen</a:t>
-            </a:r>
-            <a:endParaRPr lang="de-DE" sz="2400" dirty="0">
-              <a:solidFill>
-                <a:schemeClr val="tx1"/>
-              </a:solidFill>
-            </a:endParaRPr>
-          </a:p>
         </p:txBody>
       </p:sp>
     </p:spTree>
@@ -3293,25 +3275,47 @@
           </a:p>
         </p:txBody>
       </p:sp>
-      <p:sp>
-        <p:nvSpPr>
-          <p:cNvPr id="3" name="Inhaltsplatzhalter 2"/>
-          <p:cNvSpPr>
-            <a:spLocks noGrp="1"/>
-          </p:cNvSpPr>
-          <p:nvPr>
-            <p:ph idx="1"/>
-          </p:nvPr>
-        </p:nvSpPr>
-        <p:spPr/>
-        <p:txBody>
-          <a:bodyPr/>
-          <a:lstStyle/>
-          <a:p>
-            <a:endParaRPr lang="de-DE"/>
-          </a:p>
-        </p:txBody>
-      </p:sp>
+      <p:pic>
+        <p:nvPicPr>
+          <p:cNvPr id="1026" name="Picture 2" descr="C:\Uni\WS1920\StatPrakt\LVS\Plots\Erfassungen_nach_Kontakt.png"/>
+          <p:cNvPicPr>
+            <a:picLocks noChangeAspect="1" noChangeArrowheads="1"/>
+          </p:cNvPicPr>
+          <p:nvPr/>
+        </p:nvPicPr>
+        <p:blipFill>
+          <a:blip r:embed="rId2" cstate="print">
+            <a:extLst>
+              <a:ext uri="{28A0092B-C50C-407E-A947-70E740481C1C}">
+                <a14:useLocalDpi xmlns:a14="http://schemas.microsoft.com/office/drawing/2010/main" val="0"/>
+              </a:ext>
+            </a:extLst>
+          </a:blip>
+          <a:srcRect/>
+          <a:stretch>
+            <a:fillRect/>
+          </a:stretch>
+        </p:blipFill>
+        <p:spPr bwMode="auto">
+          <a:xfrm>
+            <a:off x="1259632" y="1340768"/>
+            <a:ext cx="7218363" cy="5237162"/>
+          </a:xfrm>
+          <a:prstGeom prst="rect">
+            <a:avLst/>
+          </a:prstGeom>
+          <a:noFill/>
+          <a:extLst>
+            <a:ext uri="{909E8E84-426E-40DD-AFC4-6F175D3DCCD1}">
+              <a14:hiddenFill xmlns:a14="http://schemas.microsoft.com/office/drawing/2010/main">
+                <a:solidFill>
+                  <a:srgbClr val="FFFFFF"/>
+                </a:solidFill>
+              </a14:hiddenFill>
+            </a:ext>
+          </a:extLst>
+        </p:spPr>
+      </p:pic>
     </p:spTree>
     <p:extLst>
       <p:ext uri="{BB962C8B-B14F-4D97-AF65-F5344CB8AC3E}">
@@ -3367,31 +3371,57 @@
             </a:r>
             <a:r>
               <a:rPr lang="de-DE" dirty="0" smtClean="0"/>
-              <a:t> Analyse?</a:t>
+              <a:t> </a:t>
+            </a:r>
+            <a:r>
+              <a:rPr lang="de-DE" dirty="0" smtClean="0"/>
+              <a:t>Analyse</a:t>
             </a:r>
             <a:endParaRPr lang="de-DE" dirty="0"/>
           </a:p>
         </p:txBody>
       </p:sp>
-      <p:sp>
-        <p:nvSpPr>
-          <p:cNvPr id="3" name="Inhaltsplatzhalter 2"/>
-          <p:cNvSpPr>
-            <a:spLocks noGrp="1"/>
-          </p:cNvSpPr>
-          <p:nvPr>
-            <p:ph idx="1"/>
-          </p:nvPr>
-        </p:nvSpPr>
-        <p:spPr/>
-        <p:txBody>
-          <a:bodyPr/>
-          <a:lstStyle/>
-          <a:p>
-            <a:endParaRPr lang="de-DE"/>
-          </a:p>
-        </p:txBody>
-      </p:sp>
+      <p:pic>
+        <p:nvPicPr>
+          <p:cNvPr id="2050" name="Picture 2" descr="C:\Uni\WS1920\StatPrakt\LVS\Plots\Anteil_nach_Gruppe.png"/>
+          <p:cNvPicPr>
+            <a:picLocks noChangeAspect="1" noChangeArrowheads="1"/>
+          </p:cNvPicPr>
+          <p:nvPr/>
+        </p:nvPicPr>
+        <p:blipFill>
+          <a:blip r:embed="rId2" cstate="print">
+            <a:extLst>
+              <a:ext uri="{28A0092B-C50C-407E-A947-70E740481C1C}">
+                <a14:useLocalDpi xmlns:a14="http://schemas.microsoft.com/office/drawing/2010/main" val="0"/>
+              </a:ext>
+            </a:extLst>
+          </a:blip>
+          <a:srcRect/>
+          <a:stretch>
+            <a:fillRect/>
+          </a:stretch>
+        </p:blipFill>
+        <p:spPr bwMode="auto">
+          <a:xfrm>
+            <a:off x="1043608" y="1196752"/>
+            <a:ext cx="7218362" cy="5237162"/>
+          </a:xfrm>
+          <a:prstGeom prst="rect">
+            <a:avLst/>
+          </a:prstGeom>
+          <a:noFill/>
+          <a:extLst>
+            <a:ext uri="{909E8E84-426E-40DD-AFC4-6F175D3DCCD1}">
+              <a14:hiddenFill xmlns:a14="http://schemas.microsoft.com/office/drawing/2010/main">
+                <a:solidFill>
+                  <a:srgbClr val="FFFFFF"/>
+                </a:solidFill>
+              </a14:hiddenFill>
+            </a:ext>
+          </a:extLst>
+        </p:spPr>
+      </p:pic>
     </p:spTree>
     <p:extLst>
       <p:ext uri="{BB962C8B-B14F-4D97-AF65-F5344CB8AC3E}">
@@ -3457,7 +3487,9 @@
         </p:nvSpPr>
         <p:spPr/>
         <p:txBody>
-          <a:bodyPr/>
+          <a:bodyPr>
+            <a:normAutofit lnSpcReduction="10000"/>
+          </a:bodyPr>
           <a:lstStyle/>
           <a:p>
             <a:pPr marL="0" indent="0">
@@ -3465,7 +3497,26 @@
             </a:pPr>
             <a:r>
               <a:rPr lang="de-DE" dirty="0" smtClean="0"/>
-              <a:t>4 verschiedene Szenarien:</a:t>
+              <a:t>Überlegung: Wie wirken sich mögl. Szenarien für Messfehler auf Modelle aus?</a:t>
+            </a:r>
+          </a:p>
+          <a:p>
+            <a:pPr marL="0" indent="0">
+              <a:buNone/>
+            </a:pPr>
+            <a:endParaRPr lang="de-DE" dirty="0"/>
+          </a:p>
+          <a:p>
+            <a:pPr marL="0" indent="0">
+              <a:buNone/>
+            </a:pPr>
+            <a:r>
+              <a:rPr lang="de-DE" dirty="0" smtClean="0"/>
+              <a:t>4 </a:t>
+            </a:r>
+            <a:r>
+              <a:rPr lang="de-DE" dirty="0" smtClean="0"/>
+              <a:t>verschiedene Szenarien:</a:t>
             </a:r>
           </a:p>
           <a:p>
@@ -3527,57 +3578,88 @@
           <a:chExt cx="0" cy="0"/>
         </a:xfrm>
       </p:grpSpPr>
-      <p:sp>
-        <p:nvSpPr>
-          <p:cNvPr id="2" name="Titel 1"/>
-          <p:cNvSpPr>
-            <a:spLocks noGrp="1"/>
-          </p:cNvSpPr>
-          <p:nvPr>
-            <p:ph type="title"/>
-          </p:nvPr>
-        </p:nvSpPr>
-        <p:spPr/>
-        <p:txBody>
-          <a:bodyPr>
-            <a:normAutofit fontScale="90000"/>
-          </a:bodyPr>
-          <a:lstStyle/>
-          <a:p>
-            <a:r>
-              <a:rPr lang="de-DE" dirty="0" smtClean="0"/>
-              <a:t>Smooth-Vergleich zu 1 Szenario</a:t>
-            </a:r>
-            <a:br>
-              <a:rPr lang="de-DE" dirty="0" smtClean="0"/>
-            </a:br>
-            <a:r>
-              <a:rPr lang="de-DE" dirty="0" smtClean="0"/>
-              <a:t>(stufenweise)</a:t>
-            </a:r>
-            <a:endParaRPr lang="de-DE" dirty="0"/>
-          </a:p>
-        </p:txBody>
-      </p:sp>
-      <p:sp>
-        <p:nvSpPr>
-          <p:cNvPr id="3" name="Inhaltsplatzhalter 2"/>
-          <p:cNvSpPr>
-            <a:spLocks noGrp="1"/>
-          </p:cNvSpPr>
-          <p:nvPr>
-            <p:ph idx="1"/>
-          </p:nvPr>
-        </p:nvSpPr>
-        <p:spPr/>
-        <p:txBody>
-          <a:bodyPr/>
-          <a:lstStyle/>
-          <a:p>
-            <a:endParaRPr lang="de-DE" dirty="0"/>
-          </a:p>
-        </p:txBody>
-      </p:sp>
+      <p:pic>
+        <p:nvPicPr>
+          <p:cNvPr id="3074" name="Picture 2" descr="C:\Uni\WS1920\StatPrakt\LVS\Plots\grid_date_data.png"/>
+          <p:cNvPicPr>
+            <a:picLocks noChangeAspect="1" noChangeArrowheads="1"/>
+          </p:cNvPicPr>
+          <p:nvPr/>
+        </p:nvPicPr>
+        <p:blipFill>
+          <a:blip r:embed="rId2" cstate="print">
+            <a:extLst>
+              <a:ext uri="{28A0092B-C50C-407E-A947-70E740481C1C}">
+                <a14:useLocalDpi xmlns:a14="http://schemas.microsoft.com/office/drawing/2010/main" val="0"/>
+              </a:ext>
+            </a:extLst>
+          </a:blip>
+          <a:srcRect/>
+          <a:stretch>
+            <a:fillRect/>
+          </a:stretch>
+        </p:blipFill>
+        <p:spPr bwMode="auto">
+          <a:xfrm>
+            <a:off x="1115616" y="476672"/>
+            <a:ext cx="6696744" cy="2750793"/>
+          </a:xfrm>
+          <a:prstGeom prst="rect">
+            <a:avLst/>
+          </a:prstGeom>
+          <a:noFill/>
+          <a:extLst>
+            <a:ext uri="{909E8E84-426E-40DD-AFC4-6F175D3DCCD1}">
+              <a14:hiddenFill xmlns:a14="http://schemas.microsoft.com/office/drawing/2010/main">
+                <a:solidFill>
+                  <a:srgbClr val="FFFFFF"/>
+                </a:solidFill>
+              </a14:hiddenFill>
+            </a:ext>
+          </a:extLst>
+        </p:spPr>
+      </p:pic>
+      <p:pic>
+        <p:nvPicPr>
+          <p:cNvPr id="3075" name="Picture 3" descr="C:\Uni\WS1920\StatPrakt\LVS\Plots\grid_date_data_general.png"/>
+          <p:cNvPicPr>
+            <a:picLocks noChangeAspect="1" noChangeArrowheads="1"/>
+          </p:cNvPicPr>
+          <p:nvPr/>
+        </p:nvPicPr>
+        <p:blipFill>
+          <a:blip r:embed="rId3" cstate="print">
+            <a:extLst>
+              <a:ext uri="{28A0092B-C50C-407E-A947-70E740481C1C}">
+                <a14:useLocalDpi xmlns:a14="http://schemas.microsoft.com/office/drawing/2010/main" val="0"/>
+              </a:ext>
+            </a:extLst>
+          </a:blip>
+          <a:srcRect/>
+          <a:stretch>
+            <a:fillRect/>
+          </a:stretch>
+        </p:blipFill>
+        <p:spPr bwMode="auto">
+          <a:xfrm>
+            <a:off x="1447831" y="3501008"/>
+            <a:ext cx="6350186" cy="2945619"/>
+          </a:xfrm>
+          <a:prstGeom prst="rect">
+            <a:avLst/>
+          </a:prstGeom>
+          <a:noFill/>
+          <a:extLst>
+            <a:ext uri="{909E8E84-426E-40DD-AFC4-6F175D3DCCD1}">
+              <a14:hiddenFill xmlns:a14="http://schemas.microsoft.com/office/drawing/2010/main">
+                <a:solidFill>
+                  <a:srgbClr val="FFFFFF"/>
+                </a:solidFill>
+              </a14:hiddenFill>
+            </a:ext>
+          </a:extLst>
+        </p:spPr>
+      </p:pic>
     </p:spTree>
     <p:extLst>
       <p:ext uri="{BB962C8B-B14F-4D97-AF65-F5344CB8AC3E}">
@@ -3627,38 +3709,118 @@
           <a:p>
             <a:r>
               <a:rPr lang="de-DE" dirty="0" smtClean="0"/>
-              <a:t>Signifikanzvergleich zu 1 Szenario</a:t>
+              <a:t>Tabelle für Signifikanzen</a:t>
             </a:r>
             <a:br>
               <a:rPr lang="de-DE" dirty="0" smtClean="0"/>
             </a:br>
+            <a:endParaRPr lang="de-DE" dirty="0"/>
+          </a:p>
+        </p:txBody>
+      </p:sp>
+      <p:sp>
+        <p:nvSpPr>
+          <p:cNvPr id="3" name="Inhaltsplatzhalter 2"/>
+          <p:cNvSpPr>
+            <a:spLocks noGrp="1"/>
+          </p:cNvSpPr>
+          <p:nvPr>
+            <p:ph idx="1"/>
+          </p:nvPr>
+        </p:nvSpPr>
+        <p:spPr/>
+        <p:txBody>
+          <a:bodyPr/>
+          <a:lstStyle/>
+          <a:p>
             <a:r>
               <a:rPr lang="de-DE" dirty="0" smtClean="0"/>
-              <a:t>(stufenweise)</a:t>
-            </a:r>
+              <a:t>Noch einzufügen</a:t>
+            </a:r>
+          </a:p>
+          <a:p>
             <a:endParaRPr lang="de-DE" dirty="0"/>
           </a:p>
         </p:txBody>
       </p:sp>
-      <p:sp>
-        <p:nvSpPr>
-          <p:cNvPr id="3" name="Inhaltsplatzhalter 2"/>
-          <p:cNvSpPr>
-            <a:spLocks noGrp="1"/>
-          </p:cNvSpPr>
-          <p:nvPr>
-            <p:ph idx="1"/>
-          </p:nvPr>
-        </p:nvSpPr>
-        <p:spPr/>
-        <p:txBody>
-          <a:bodyPr/>
-          <a:lstStyle/>
-          <a:p>
-            <a:endParaRPr lang="de-DE" dirty="0"/>
-          </a:p>
-        </p:txBody>
-      </p:sp>
+    </p:spTree>
+    <p:extLst>
+      <p:ext uri="{BB962C8B-B14F-4D97-AF65-F5344CB8AC3E}">
+        <p14:creationId xmlns:p14="http://schemas.microsoft.com/office/powerpoint/2010/main" val="1240395396"/>
+      </p:ext>
+    </p:extLst>
+  </p:cSld>
+  <p:clrMapOvr>
+    <a:masterClrMapping/>
+  </p:clrMapOvr>
+  <p:timing>
+    <p:tnLst>
+      <p:par>
+        <p:cTn id="1" dur="indefinite" restart="never" nodeType="tmRoot"/>
+      </p:par>
+    </p:tnLst>
+  </p:timing>
+</p:sld>
+</file>
+
+<file path=ppt/slides/slide7.xml><?xml version="1.0" encoding="utf-8"?>
+<p:sld xmlns:a="http://schemas.openxmlformats.org/drawingml/2006/main" xmlns:r="http://schemas.openxmlformats.org/officeDocument/2006/relationships" xmlns:p="http://schemas.openxmlformats.org/presentationml/2006/main">
+  <p:cSld>
+    <p:spTree>
+      <p:nvGrpSpPr>
+        <p:cNvPr id="1" name=""/>
+        <p:cNvGrpSpPr/>
+        <p:nvPr/>
+      </p:nvGrpSpPr>
+      <p:grpSpPr>
+        <a:xfrm>
+          <a:off x="0" y="0"/>
+          <a:ext cx="0" cy="0"/>
+          <a:chOff x="0" y="0"/>
+          <a:chExt cx="0" cy="0"/>
+        </a:xfrm>
+      </p:grpSpPr>
+      <p:pic>
+        <p:nvPicPr>
+          <p:cNvPr id="4098" name="Picture 2" descr="C:\Uni\WS1920\StatPrakt\LVS\Plots\Szenarien_date_model.png"/>
+          <p:cNvPicPr>
+            <a:picLocks noChangeAspect="1" noChangeArrowheads="1"/>
+          </p:cNvPicPr>
+          <p:nvPr/>
+        </p:nvPicPr>
+        <p:blipFill>
+          <a:blip r:embed="rId2" cstate="print">
+            <a:extLst>
+              <a:ext uri="{28A0092B-C50C-407E-A947-70E740481C1C}">
+                <a14:useLocalDpi xmlns:a14="http://schemas.microsoft.com/office/drawing/2010/main" val="0"/>
+              </a:ext>
+            </a:extLst>
+          </a:blip>
+          <a:srcRect/>
+          <a:stretch>
+            <a:fillRect/>
+          </a:stretch>
+        </p:blipFill>
+        <p:spPr bwMode="auto">
+          <a:xfrm>
+            <a:off x="395536" y="404664"/>
+            <a:ext cx="8339488" cy="6048672"/>
+          </a:xfrm>
+          <a:prstGeom prst="rect">
+            <a:avLst/>
+          </a:prstGeom>
+          <a:noFill/>
+          <a:extLst>
+            <a:ext uri="{909E8E84-426E-40DD-AFC4-6F175D3DCCD1}">
+              <a14:hiddenFill xmlns:a14="http://schemas.microsoft.com/office/drawing/2010/main">
+                <a:solidFill>
+                  <a:srgbClr val="FFFFFF"/>
+                </a:solidFill>
+              </a14:hiddenFill>
+            </a:ext>
+          </a:extLst>
+        </p:spPr>
+      </p:pic>
     </p:spTree>
     <p:extLst>
       <p:ext uri="{BB962C8B-B14F-4D97-AF65-F5344CB8AC3E}">
@@ -3669,6 +3831,13 @@
   <p:clrMapOvr>
     <a:masterClrMapping/>
   </p:clrMapOvr>
+  <p:timing>
+    <p:tnLst>
+      <p:par>
+        <p:cTn id="1" dur="indefinite" restart="never" nodeType="tmRoot"/>
+      </p:par>
+    </p:tnLst>
+  </p:timing>
 </p:sld>
 </file>
 

</xml_diff>

<commit_message>
Plots für Präsentation angepasst
</commit_message>
<xml_diff>
--- a/Organisatorisches/messfehlerfolien.pptx
+++ b/Organisatorisches/messfehlerfolien.pptx
@@ -5,13 +5,17 @@
     <p:sldMasterId id="2147483648" r:id="rId1"/>
   </p:sldMasterIdLst>
   <p:sldIdLst>
-    <p:sldId id="256" r:id="rId2"/>
+    <p:sldId id="264" r:id="rId2"/>
     <p:sldId id="257" r:id="rId3"/>
     <p:sldId id="258" r:id="rId4"/>
     <p:sldId id="259" r:id="rId5"/>
-    <p:sldId id="260" r:id="rId6"/>
-    <p:sldId id="262" r:id="rId7"/>
-    <p:sldId id="261" r:id="rId8"/>
+    <p:sldId id="265" r:id="rId6"/>
+    <p:sldId id="260" r:id="rId7"/>
+    <p:sldId id="266" r:id="rId8"/>
+    <p:sldId id="262" r:id="rId9"/>
+    <p:sldId id="267" r:id="rId10"/>
+    <p:sldId id="268" r:id="rId11"/>
+    <p:sldId id="269" r:id="rId12"/>
   </p:sldIdLst>
   <p:sldSz cx="9144000" cy="6858000" type="screen4x3"/>
   <p:notesSz cx="6858000" cy="9144000"/>
@@ -294,7 +298,7 @@
           <a:p>
             <a:fld id="{81A98D77-E3DE-4A84-BF14-249A5C4446C9}" type="datetimeFigureOut">
               <a:rPr lang="de-DE" smtClean="0"/>
-              <a:t>14.05.2020</a:t>
+              <a:t>28.05.2020</a:t>
             </a:fld>
             <a:endParaRPr lang="de-DE"/>
           </a:p>
@@ -464,7 +468,7 @@
           <a:p>
             <a:fld id="{81A98D77-E3DE-4A84-BF14-249A5C4446C9}" type="datetimeFigureOut">
               <a:rPr lang="de-DE" smtClean="0"/>
-              <a:t>14.05.2020</a:t>
+              <a:t>28.05.2020</a:t>
             </a:fld>
             <a:endParaRPr lang="de-DE"/>
           </a:p>
@@ -644,7 +648,7 @@
           <a:p>
             <a:fld id="{81A98D77-E3DE-4A84-BF14-249A5C4446C9}" type="datetimeFigureOut">
               <a:rPr lang="de-DE" smtClean="0"/>
-              <a:t>14.05.2020</a:t>
+              <a:t>28.05.2020</a:t>
             </a:fld>
             <a:endParaRPr lang="de-DE"/>
           </a:p>
@@ -814,7 +818,7 @@
           <a:p>
             <a:fld id="{81A98D77-E3DE-4A84-BF14-249A5C4446C9}" type="datetimeFigureOut">
               <a:rPr lang="de-DE" smtClean="0"/>
-              <a:t>14.05.2020</a:t>
+              <a:t>28.05.2020</a:t>
             </a:fld>
             <a:endParaRPr lang="de-DE"/>
           </a:p>
@@ -1060,7 +1064,7 @@
           <a:p>
             <a:fld id="{81A98D77-E3DE-4A84-BF14-249A5C4446C9}" type="datetimeFigureOut">
               <a:rPr lang="de-DE" smtClean="0"/>
-              <a:t>14.05.2020</a:t>
+              <a:t>28.05.2020</a:t>
             </a:fld>
             <a:endParaRPr lang="de-DE"/>
           </a:p>
@@ -1348,7 +1352,7 @@
           <a:p>
             <a:fld id="{81A98D77-E3DE-4A84-BF14-249A5C4446C9}" type="datetimeFigureOut">
               <a:rPr lang="de-DE" smtClean="0"/>
-              <a:t>14.05.2020</a:t>
+              <a:t>28.05.2020</a:t>
             </a:fld>
             <a:endParaRPr lang="de-DE"/>
           </a:p>
@@ -1770,7 +1774,7 @@
           <a:p>
             <a:fld id="{81A98D77-E3DE-4A84-BF14-249A5C4446C9}" type="datetimeFigureOut">
               <a:rPr lang="de-DE" smtClean="0"/>
-              <a:t>14.05.2020</a:t>
+              <a:t>28.05.2020</a:t>
             </a:fld>
             <a:endParaRPr lang="de-DE"/>
           </a:p>
@@ -1888,7 +1892,7 @@
           <a:p>
             <a:fld id="{81A98D77-E3DE-4A84-BF14-249A5C4446C9}" type="datetimeFigureOut">
               <a:rPr lang="de-DE" smtClean="0"/>
-              <a:t>14.05.2020</a:t>
+              <a:t>28.05.2020</a:t>
             </a:fld>
             <a:endParaRPr lang="de-DE"/>
           </a:p>
@@ -1983,7 +1987,7 @@
           <a:p>
             <a:fld id="{81A98D77-E3DE-4A84-BF14-249A5C4446C9}" type="datetimeFigureOut">
               <a:rPr lang="de-DE" smtClean="0"/>
-              <a:t>14.05.2020</a:t>
+              <a:t>28.05.2020</a:t>
             </a:fld>
             <a:endParaRPr lang="de-DE"/>
           </a:p>
@@ -2260,7 +2264,7 @@
           <a:p>
             <a:fld id="{81A98D77-E3DE-4A84-BF14-249A5C4446C9}" type="datetimeFigureOut">
               <a:rPr lang="de-DE" smtClean="0"/>
-              <a:t>14.05.2020</a:t>
+              <a:t>28.05.2020</a:t>
             </a:fld>
             <a:endParaRPr lang="de-DE"/>
           </a:p>
@@ -2513,7 +2517,7 @@
           <a:p>
             <a:fld id="{81A98D77-E3DE-4A84-BF14-249A5C4446C9}" type="datetimeFigureOut">
               <a:rPr lang="de-DE" smtClean="0"/>
-              <a:t>14.05.2020</a:t>
+              <a:t>28.05.2020</a:t>
             </a:fld>
             <a:endParaRPr lang="de-DE"/>
           </a:p>
@@ -2726,7 +2730,7 @@
           <a:p>
             <a:fld id="{81A98D77-E3DE-4A84-BF14-249A5C4446C9}" type="datetimeFigureOut">
               <a:rPr lang="de-DE" smtClean="0"/>
-              <a:t>14.05.2020</a:t>
+              <a:t>28.05.2020</a:t>
             </a:fld>
             <a:endParaRPr lang="de-DE"/>
           </a:p>
@@ -3103,129 +3107,253 @@
       </p:grpSpPr>
       <p:sp>
         <p:nvSpPr>
-          <p:cNvPr id="3" name="Untertitel 2"/>
-          <p:cNvSpPr>
-            <a:spLocks noGrp="1"/>
-          </p:cNvSpPr>
-          <p:nvPr>
-            <p:ph type="subTitle" idx="1"/>
-          </p:nvPr>
-        </p:nvSpPr>
-        <p:spPr>
-          <a:xfrm>
-            <a:off x="1371600" y="548680"/>
-            <a:ext cx="6400800" cy="5090120"/>
-          </a:xfrm>
-        </p:spPr>
+          <p:cNvPr id="2" name="Titel 1"/>
+          <p:cNvSpPr>
+            <a:spLocks noGrp="1"/>
+          </p:cNvSpPr>
+          <p:nvPr>
+            <p:ph type="title"/>
+          </p:nvPr>
+        </p:nvSpPr>
+        <p:spPr/>
         <p:txBody>
           <a:bodyPr>
             <a:normAutofit/>
           </a:bodyPr>
           <a:lstStyle/>
           <a:p>
-            <a:pPr marL="457200" indent="-457200">
-              <a:buFont typeface="Arial" panose="020B0604020202020204" pitchFamily="34" charset="0"/>
-              <a:buChar char="•"/>
+            <a:r>
+              <a:rPr lang="de-DE" dirty="0" smtClean="0"/>
+              <a:t>Messfehleranalyse</a:t>
+            </a:r>
+            <a:endParaRPr lang="de-DE" dirty="0"/>
+          </a:p>
+        </p:txBody>
+      </p:sp>
+      <p:sp>
+        <p:nvSpPr>
+          <p:cNvPr id="3" name="Inhaltsplatzhalter 2"/>
+          <p:cNvSpPr>
+            <a:spLocks noGrp="1"/>
+          </p:cNvSpPr>
+          <p:nvPr>
+            <p:ph idx="1"/>
+          </p:nvPr>
+        </p:nvSpPr>
+        <p:spPr/>
+        <p:txBody>
+          <a:bodyPr/>
+          <a:lstStyle/>
+          <a:p>
+            <a:r>
+              <a:rPr lang="de-DE" dirty="0" smtClean="0"/>
+              <a:t>Messfehler: Abweichung der gemessenen Daten vom wahren Wert </a:t>
+            </a:r>
+          </a:p>
+          <a:p>
+            <a:pPr marL="0" indent="0">
+              <a:buNone/>
             </a:pPr>
             <a:r>
-              <a:rPr lang="de-DE" sz="2400" dirty="0" smtClean="0">
-                <a:solidFill>
-                  <a:schemeClr val="tx1"/>
-                </a:solidFill>
-              </a:rPr>
-              <a:t>Wissen aus Untersuchungen: </a:t>
-            </a:r>
-            <a:r>
-              <a:rPr lang="de-DE" sz="2400" dirty="0" err="1" smtClean="0">
-                <a:solidFill>
-                  <a:schemeClr val="tx1"/>
-                </a:solidFill>
-              </a:rPr>
-              <a:t>Checkpointdaten</a:t>
-            </a:r>
-            <a:r>
-              <a:rPr lang="de-DE" sz="2400" dirty="0" smtClean="0">
-                <a:solidFill>
-                  <a:schemeClr val="tx1"/>
-                </a:solidFill>
-              </a:rPr>
-              <a:t> haben Messfehler</a:t>
-            </a:r>
-          </a:p>
-          <a:p>
-            <a:pPr marL="457200" indent="-457200">
-              <a:buFont typeface="Arial" panose="020B0604020202020204" pitchFamily="34" charset="0"/>
-              <a:buChar char="•"/>
-            </a:pPr>
-            <a:endParaRPr lang="de-DE" sz="2400" dirty="0" smtClean="0">
-              <a:solidFill>
-                <a:schemeClr val="tx1"/>
-              </a:solidFill>
-            </a:endParaRPr>
-          </a:p>
-          <a:p>
-            <a:pPr marL="457200" indent="-457200">
-              <a:buFont typeface="Arial" panose="020B0604020202020204" pitchFamily="34" charset="0"/>
-              <a:buChar char="•"/>
-            </a:pPr>
-            <a:r>
-              <a:rPr lang="de-DE" sz="2400" dirty="0" smtClean="0">
-                <a:solidFill>
-                  <a:schemeClr val="tx1"/>
-                </a:solidFill>
-              </a:rPr>
-              <a:t>Neuen Daten zur Saison 19/20</a:t>
-            </a:r>
-          </a:p>
-          <a:p>
-            <a:r>
-              <a:rPr lang="de-DE" sz="2400" dirty="0" smtClean="0">
-                <a:solidFill>
-                  <a:schemeClr val="tx1"/>
-                </a:solidFill>
-              </a:rPr>
-              <a:t>    </a:t>
-            </a:r>
-            <a:r>
-              <a:rPr lang="de-DE" sz="2400" dirty="0" err="1" smtClean="0">
-                <a:solidFill>
-                  <a:schemeClr val="tx1"/>
-                </a:solidFill>
-              </a:rPr>
-              <a:t>Checkpointdaten</a:t>
-            </a:r>
-            <a:r>
-              <a:rPr lang="de-DE" sz="2400" dirty="0" smtClean="0">
-                <a:solidFill>
-                  <a:schemeClr val="tx1"/>
-                </a:solidFill>
-              </a:rPr>
-              <a:t>: vollständig</a:t>
-            </a:r>
-          </a:p>
-          <a:p>
-            <a:r>
-              <a:rPr lang="de-DE" sz="2400" dirty="0" smtClean="0">
-                <a:solidFill>
-                  <a:schemeClr val="tx1"/>
-                </a:solidFill>
-              </a:rPr>
-              <a:t>	Manuell erhobene Daten: nur 2 Tage</a:t>
-            </a:r>
-          </a:p>
-          <a:p>
-            <a:endParaRPr lang="de-DE" sz="2400" dirty="0">
-              <a:solidFill>
-                <a:schemeClr val="tx1"/>
-              </a:solidFill>
-            </a:endParaRPr>
+              <a:rPr lang="de-DE" dirty="0"/>
+              <a:t> </a:t>
+            </a:r>
+            <a:r>
+              <a:rPr lang="de-DE" dirty="0" smtClean="0"/>
+              <a:t>    -&gt; Unter-/Überschätzung</a:t>
+            </a:r>
+          </a:p>
+          <a:p>
+            <a:r>
+              <a:rPr lang="de-DE" dirty="0" smtClean="0"/>
+              <a:t>Existenz festgestellt durch manuelle Zählungen</a:t>
+            </a:r>
+          </a:p>
+          <a:p>
+            <a:r>
+              <a:rPr lang="de-DE" dirty="0" smtClean="0"/>
+              <a:t>Beispiele: Erkennung abhängig von der Distanz zum Checkpoint, Hund wurde erfasst</a:t>
+            </a:r>
+          </a:p>
+          <a:p>
+            <a:r>
+              <a:rPr lang="de-DE" dirty="0" smtClean="0"/>
+              <a:t>Zählungen an zwei Tagen: 27. &amp; 28.02.2020</a:t>
+            </a:r>
           </a:p>
         </p:txBody>
       </p:sp>
     </p:spTree>
     <p:extLst>
       <p:ext uri="{BB962C8B-B14F-4D97-AF65-F5344CB8AC3E}">
-        <p14:creationId xmlns:p14="http://schemas.microsoft.com/office/powerpoint/2010/main" val="2943906842"/>
+        <p14:creationId xmlns:p14="http://schemas.microsoft.com/office/powerpoint/2010/main" val="1427054591"/>
+      </p:ext>
+    </p:extLst>
+  </p:cSld>
+  <p:clrMapOvr>
+    <a:masterClrMapping/>
+  </p:clrMapOvr>
+</p:sld>
+</file>
+
+<file path=ppt/slides/slide10.xml><?xml version="1.0" encoding="utf-8"?>
+<p:sld xmlns:a="http://schemas.openxmlformats.org/drawingml/2006/main" xmlns:r="http://schemas.openxmlformats.org/officeDocument/2006/relationships" xmlns:p="http://schemas.openxmlformats.org/presentationml/2006/main">
+  <p:cSld>
+    <p:spTree>
+      <p:nvGrpSpPr>
+        <p:cNvPr id="1" name=""/>
+        <p:cNvGrpSpPr/>
+        <p:nvPr/>
+      </p:nvGrpSpPr>
+      <p:grpSpPr>
+        <a:xfrm>
+          <a:off x="0" y="0"/>
+          <a:ext cx="0" cy="0"/>
+          <a:chOff x="0" y="0"/>
+          <a:chExt cx="0" cy="0"/>
+        </a:xfrm>
+      </p:grpSpPr>
+      <p:pic>
+        <p:nvPicPr>
+          <p:cNvPr id="3074" name="Picture 2" descr="C:\Uni\WS1920\StatPrakt\LVS\Plots\Szenario1.png"/>
+          <p:cNvPicPr>
+            <a:picLocks noChangeAspect="1" noChangeArrowheads="1"/>
+          </p:cNvPicPr>
+          <p:nvPr/>
+        </p:nvPicPr>
+        <p:blipFill>
+          <a:blip r:embed="rId2" cstate="print">
+            <a:extLst>
+              <a:ext uri="{28A0092B-C50C-407E-A947-70E740481C1C}">
+                <a14:useLocalDpi xmlns:a14="http://schemas.microsoft.com/office/drawing/2010/main" val="0"/>
+              </a:ext>
+            </a:extLst>
+          </a:blip>
+          <a:srcRect/>
+          <a:stretch>
+            <a:fillRect/>
+          </a:stretch>
+        </p:blipFill>
+        <p:spPr bwMode="auto">
+          <a:xfrm>
+            <a:off x="1331640" y="1484784"/>
+            <a:ext cx="7200800" cy="5244291"/>
+          </a:xfrm>
+          <a:prstGeom prst="rect">
+            <a:avLst/>
+          </a:prstGeom>
+          <a:noFill/>
+          <a:extLst>
+            <a:ext uri="{909E8E84-426E-40DD-AFC4-6F175D3DCCD1}">
+              <a14:hiddenFill xmlns:a14="http://schemas.microsoft.com/office/drawing/2010/main">
+                <a:solidFill>
+                  <a:srgbClr val="FFFFFF"/>
+                </a:solidFill>
+              </a14:hiddenFill>
+            </a:ext>
+          </a:extLst>
+        </p:spPr>
+      </p:pic>
+      <p:sp>
+        <p:nvSpPr>
+          <p:cNvPr id="4" name="Titel 3"/>
+          <p:cNvSpPr>
+            <a:spLocks noGrp="1"/>
+          </p:cNvSpPr>
+          <p:nvPr>
+            <p:ph type="title"/>
+          </p:nvPr>
+        </p:nvSpPr>
+        <p:spPr/>
+        <p:txBody>
+          <a:bodyPr>
+            <a:normAutofit fontScale="90000"/>
+          </a:bodyPr>
+          <a:lstStyle/>
+          <a:p>
+            <a:r>
+              <a:rPr lang="de-DE" dirty="0" smtClean="0"/>
+              <a:t>Vergleich für versch. Werte von genereller Unterschätzung</a:t>
+            </a:r>
+            <a:endParaRPr lang="de-DE" dirty="0"/>
+          </a:p>
+        </p:txBody>
+      </p:sp>
+    </p:spTree>
+    <p:extLst>
+      <p:ext uri="{BB962C8B-B14F-4D97-AF65-F5344CB8AC3E}">
+        <p14:creationId xmlns:p14="http://schemas.microsoft.com/office/powerpoint/2010/main" val="1981481918"/>
+      </p:ext>
+    </p:extLst>
+  </p:cSld>
+  <p:clrMapOvr>
+    <a:masterClrMapping/>
+  </p:clrMapOvr>
+</p:sld>
+</file>
+
+<file path=ppt/slides/slide11.xml><?xml version="1.0" encoding="utf-8"?>
+<p:sld xmlns:a="http://schemas.openxmlformats.org/drawingml/2006/main" xmlns:r="http://schemas.openxmlformats.org/officeDocument/2006/relationships" xmlns:p="http://schemas.openxmlformats.org/presentationml/2006/main">
+  <p:cSld>
+    <p:spTree>
+      <p:nvGrpSpPr>
+        <p:cNvPr id="1" name=""/>
+        <p:cNvGrpSpPr/>
+        <p:nvPr/>
+      </p:nvGrpSpPr>
+      <p:grpSpPr>
+        <a:xfrm>
+          <a:off x="0" y="0"/>
+          <a:ext cx="0" cy="0"/>
+          <a:chOff x="0" y="0"/>
+          <a:chExt cx="0" cy="0"/>
+        </a:xfrm>
+      </p:grpSpPr>
+      <p:sp>
+        <p:nvSpPr>
+          <p:cNvPr id="2" name="Titel 1"/>
+          <p:cNvSpPr>
+            <a:spLocks noGrp="1"/>
+          </p:cNvSpPr>
+          <p:nvPr>
+            <p:ph type="title"/>
+          </p:nvPr>
+        </p:nvSpPr>
+        <p:spPr/>
+        <p:txBody>
+          <a:bodyPr/>
+          <a:lstStyle/>
+          <a:p>
+            <a:endParaRPr lang="de-DE"/>
+          </a:p>
+        </p:txBody>
+      </p:sp>
+      <p:sp>
+        <p:nvSpPr>
+          <p:cNvPr id="3" name="Inhaltsplatzhalter 2"/>
+          <p:cNvSpPr>
+            <a:spLocks noGrp="1"/>
+          </p:cNvSpPr>
+          <p:nvPr>
+            <p:ph idx="1"/>
+          </p:nvPr>
+        </p:nvSpPr>
+        <p:spPr/>
+        <p:txBody>
+          <a:bodyPr/>
+          <a:lstStyle/>
+          <a:p>
+            <a:pPr marL="0" indent="0">
+              <a:buNone/>
+            </a:pPr>
+            <a:endParaRPr lang="de-DE" dirty="0"/>
+          </a:p>
+        </p:txBody>
+      </p:sp>
+    </p:spTree>
+    <p:extLst>
+      <p:ext uri="{BB962C8B-B14F-4D97-AF65-F5344CB8AC3E}">
+        <p14:creationId xmlns:p14="http://schemas.microsoft.com/office/powerpoint/2010/main" val="3669576245"/>
       </p:ext>
     </p:extLst>
   </p:cSld>
@@ -3252,29 +3380,6 @@
           <a:chExt cx="0" cy="0"/>
         </a:xfrm>
       </p:grpSpPr>
-      <p:sp>
-        <p:nvSpPr>
-          <p:cNvPr id="2" name="Titel 1"/>
-          <p:cNvSpPr>
-            <a:spLocks noGrp="1"/>
-          </p:cNvSpPr>
-          <p:nvPr>
-            <p:ph type="title"/>
-          </p:nvPr>
-        </p:nvSpPr>
-        <p:spPr/>
-        <p:txBody>
-          <a:bodyPr/>
-          <a:lstStyle/>
-          <a:p>
-            <a:r>
-              <a:rPr lang="de-DE" dirty="0" smtClean="0"/>
-              <a:t>Plot zur deskriptiven Analyse</a:t>
-            </a:r>
-            <a:endParaRPr lang="de-DE" dirty="0"/>
-          </a:p>
-        </p:txBody>
-      </p:sp>
       <p:pic>
         <p:nvPicPr>
           <p:cNvPr id="1026" name="Picture 2" descr="C:\Uni\WS1920\StatPrakt\LVS\Plots\Erfassungen_nach_Kontakt.png"/>
@@ -3346,41 +3451,6 @@
           <a:chExt cx="0" cy="0"/>
         </a:xfrm>
       </p:grpSpPr>
-      <p:sp>
-        <p:nvSpPr>
-          <p:cNvPr id="2" name="Titel 1"/>
-          <p:cNvSpPr>
-            <a:spLocks noGrp="1"/>
-          </p:cNvSpPr>
-          <p:nvPr>
-            <p:ph type="title"/>
-          </p:nvPr>
-        </p:nvSpPr>
-        <p:spPr/>
-        <p:txBody>
-          <a:bodyPr/>
-          <a:lstStyle/>
-          <a:p>
-            <a:r>
-              <a:rPr lang="de-DE" dirty="0" smtClean="0"/>
-              <a:t>2. Plot zur </a:t>
-            </a:r>
-            <a:r>
-              <a:rPr lang="de-DE" dirty="0" err="1" smtClean="0"/>
-              <a:t>deskr</a:t>
-            </a:r>
-            <a:r>
-              <a:rPr lang="de-DE" dirty="0" smtClean="0"/>
-              <a:t> </a:t>
-            </a:r>
-            <a:r>
-              <a:rPr lang="de-DE" dirty="0" smtClean="0"/>
-              <a:t>Analyse</a:t>
-            </a:r>
-            <a:endParaRPr lang="de-DE" dirty="0"/>
-          </a:p>
-        </p:txBody>
-      </p:sp>
       <p:pic>
         <p:nvPicPr>
           <p:cNvPr id="2050" name="Picture 2" descr="C:\Uni\WS1920\StatPrakt\LVS\Plots\Anteil_nach_Gruppe.png"/>
@@ -3488,60 +3558,46 @@
         <p:spPr/>
         <p:txBody>
           <a:bodyPr>
-            <a:normAutofit lnSpcReduction="10000"/>
+            <a:normAutofit/>
           </a:bodyPr>
           <a:lstStyle/>
           <a:p>
-            <a:pPr marL="0" indent="0">
-              <a:buNone/>
-            </a:pPr>
             <a:r>
               <a:rPr lang="de-DE" dirty="0" smtClean="0"/>
-              <a:t>Überlegung: Wie wirken sich mögl. Szenarien für Messfehler auf Modelle aus?</a:t>
-            </a:r>
+              <a:t>Nur 2 Tage mit manuellen Zählungen, d.h. kaum Informationen über </a:t>
+            </a:r>
+            <a:r>
+              <a:rPr lang="de-DE" dirty="0" err="1" smtClean="0"/>
+              <a:t>Kovariablen</a:t>
+            </a:r>
+            <a:endParaRPr lang="de-DE" dirty="0" smtClean="0"/>
+          </a:p>
+          <a:p>
+            <a:r>
+              <a:rPr lang="de-DE" dirty="0" smtClean="0"/>
+              <a:t>Überlegung</a:t>
+            </a:r>
+            <a:r>
+              <a:rPr lang="de-DE" dirty="0" smtClean="0"/>
+              <a:t>: Wie wirken sich mögl. Szenarien für Messfehler auf Modelle aus</a:t>
+            </a:r>
+            <a:r>
+              <a:rPr lang="de-DE" dirty="0" smtClean="0"/>
+              <a:t>?</a:t>
+            </a:r>
+          </a:p>
+          <a:p>
+            <a:r>
+              <a:rPr lang="de-DE" dirty="0" smtClean="0"/>
+              <a:t>-&gt; Hinzufügen/Entfernen von Infrarotmessungen im Datensatz und Vergleich der Ergebnisse</a:t>
+            </a:r>
+            <a:endParaRPr lang="de-DE" dirty="0" smtClean="0"/>
           </a:p>
           <a:p>
             <a:pPr marL="0" indent="0">
               <a:buNone/>
             </a:pPr>
             <a:endParaRPr lang="de-DE" dirty="0"/>
-          </a:p>
-          <a:p>
-            <a:pPr marL="0" indent="0">
-              <a:buNone/>
-            </a:pPr>
-            <a:r>
-              <a:rPr lang="de-DE" dirty="0" smtClean="0"/>
-              <a:t>4 </a:t>
-            </a:r>
-            <a:r>
-              <a:rPr lang="de-DE" dirty="0" smtClean="0"/>
-              <a:t>verschiedene Szenarien:</a:t>
-            </a:r>
-          </a:p>
-          <a:p>
-            <a:r>
-              <a:rPr lang="de-DE" dirty="0" smtClean="0"/>
-              <a:t>Generelle Unterschätzung von 20%</a:t>
-            </a:r>
-          </a:p>
-          <a:p>
-            <a:r>
-              <a:rPr lang="de-DE" dirty="0" smtClean="0"/>
-              <a:t>Unterschätzung nach Gruppengröße</a:t>
-            </a:r>
-          </a:p>
-          <a:p>
-            <a:r>
-              <a:rPr lang="de-DE" dirty="0" smtClean="0"/>
-              <a:t>Nächtliche Überschätzung</a:t>
-            </a:r>
-          </a:p>
-          <a:p>
-            <a:r>
-              <a:rPr lang="de-DE" dirty="0" smtClean="0"/>
-              <a:t>Unterschätzung bei niedrigen Temperaturen</a:t>
-            </a:r>
           </a:p>
           <a:p>
             <a:endParaRPr lang="de-DE" dirty="0"/>
@@ -3578,92 +3634,72 @@
           <a:chExt cx="0" cy="0"/>
         </a:xfrm>
       </p:grpSpPr>
-      <p:pic>
-        <p:nvPicPr>
-          <p:cNvPr id="3074" name="Picture 2" descr="C:\Uni\WS1920\StatPrakt\LVS\Plots\grid_date_data.png"/>
-          <p:cNvPicPr>
-            <a:picLocks noChangeAspect="1" noChangeArrowheads="1"/>
-          </p:cNvPicPr>
-          <p:nvPr/>
-        </p:nvPicPr>
-        <p:blipFill>
-          <a:blip r:embed="rId2" cstate="print">
-            <a:extLst>
-              <a:ext uri="{28A0092B-C50C-407E-A947-70E740481C1C}">
-                <a14:useLocalDpi xmlns:a14="http://schemas.microsoft.com/office/drawing/2010/main" val="0"/>
-              </a:ext>
-            </a:extLst>
-          </a:blip>
-          <a:srcRect/>
-          <a:stretch>
-            <a:fillRect/>
-          </a:stretch>
-        </p:blipFill>
-        <p:spPr bwMode="auto">
-          <a:xfrm>
-            <a:off x="1115616" y="476672"/>
-            <a:ext cx="6696744" cy="2750793"/>
-          </a:xfrm>
-          <a:prstGeom prst="rect">
-            <a:avLst/>
-          </a:prstGeom>
-          <a:noFill/>
-          <a:extLst>
-            <a:ext uri="{909E8E84-426E-40DD-AFC4-6F175D3DCCD1}">
-              <a14:hiddenFill xmlns:a14="http://schemas.microsoft.com/office/drawing/2010/main">
-                <a:solidFill>
-                  <a:srgbClr val="FFFFFF"/>
-                </a:solidFill>
-              </a14:hiddenFill>
-            </a:ext>
-          </a:extLst>
-        </p:spPr>
-      </p:pic>
-      <p:pic>
-        <p:nvPicPr>
-          <p:cNvPr id="3075" name="Picture 3" descr="C:\Uni\WS1920\StatPrakt\LVS\Plots\grid_date_data_general.png"/>
-          <p:cNvPicPr>
-            <a:picLocks noChangeAspect="1" noChangeArrowheads="1"/>
-          </p:cNvPicPr>
-          <p:nvPr/>
-        </p:nvPicPr>
-        <p:blipFill>
-          <a:blip r:embed="rId3" cstate="print">
-            <a:extLst>
-              <a:ext uri="{28A0092B-C50C-407E-A947-70E740481C1C}">
-                <a14:useLocalDpi xmlns:a14="http://schemas.microsoft.com/office/drawing/2010/main" val="0"/>
-              </a:ext>
-            </a:extLst>
-          </a:blip>
-          <a:srcRect/>
-          <a:stretch>
-            <a:fillRect/>
-          </a:stretch>
-        </p:blipFill>
-        <p:spPr bwMode="auto">
-          <a:xfrm>
-            <a:off x="1447831" y="3501008"/>
-            <a:ext cx="6350186" cy="2945619"/>
-          </a:xfrm>
-          <a:prstGeom prst="rect">
-            <a:avLst/>
-          </a:prstGeom>
-          <a:noFill/>
-          <a:extLst>
-            <a:ext uri="{909E8E84-426E-40DD-AFC4-6F175D3DCCD1}">
-              <a14:hiddenFill xmlns:a14="http://schemas.microsoft.com/office/drawing/2010/main">
-                <a:solidFill>
-                  <a:srgbClr val="FFFFFF"/>
-                </a:solidFill>
-              </a14:hiddenFill>
-            </a:ext>
-          </a:extLst>
-        </p:spPr>
-      </p:pic>
+      <p:sp>
+        <p:nvSpPr>
+          <p:cNvPr id="3" name="Inhaltsplatzhalter 2"/>
+          <p:cNvSpPr>
+            <a:spLocks noGrp="1"/>
+          </p:cNvSpPr>
+          <p:nvPr>
+            <p:ph idx="1"/>
+          </p:nvPr>
+        </p:nvSpPr>
+        <p:spPr/>
+        <p:txBody>
+          <a:bodyPr/>
+          <a:lstStyle/>
+          <a:p>
+            <a:pPr marL="0" indent="0">
+              <a:buNone/>
+            </a:pPr>
+            <a:r>
+              <a:rPr lang="de-DE" dirty="0"/>
+              <a:t>4 verschiedene Szenarien:</a:t>
+            </a:r>
+          </a:p>
+          <a:p>
+            <a:r>
+              <a:rPr lang="de-DE" dirty="0"/>
+              <a:t>Generelle Unterschätzung</a:t>
+            </a:r>
+          </a:p>
+          <a:p>
+            <a:r>
+              <a:rPr lang="de-DE" dirty="0"/>
+              <a:t>Unterschätzung nach Gruppengröße</a:t>
+            </a:r>
+          </a:p>
+          <a:p>
+            <a:r>
+              <a:rPr lang="de-DE" dirty="0"/>
+              <a:t>Nächtliche Überschätzung</a:t>
+            </a:r>
+          </a:p>
+          <a:p>
+            <a:r>
+              <a:rPr lang="de-DE" dirty="0"/>
+              <a:t>Unterschätzung bei niedrigen Temperaturen</a:t>
+            </a:r>
+          </a:p>
+          <a:p>
+            <a:endParaRPr lang="de-DE" dirty="0" smtClean="0"/>
+          </a:p>
+          <a:p>
+            <a:pPr marL="0" indent="0">
+              <a:buNone/>
+            </a:pPr>
+            <a:r>
+              <a:rPr lang="de-DE" dirty="0" smtClean="0"/>
+              <a:t>Vergleichen Ergebnisse für das Zeitmodell</a:t>
+            </a:r>
+            <a:endParaRPr lang="de-DE" dirty="0"/>
+          </a:p>
+        </p:txBody>
+      </p:sp>
     </p:spTree>
     <p:extLst>
       <p:ext uri="{BB962C8B-B14F-4D97-AF65-F5344CB8AC3E}">
-        <p14:creationId xmlns:p14="http://schemas.microsoft.com/office/powerpoint/2010/main" val="1745839148"/>
+        <p14:creationId xmlns:p14="http://schemas.microsoft.com/office/powerpoint/2010/main" val="1623016490"/>
       </p:ext>
     </p:extLst>
   </p:cSld>
@@ -3690,6 +3726,170 @@
           <a:chExt cx="0" cy="0"/>
         </a:xfrm>
       </p:grpSpPr>
+      <p:pic>
+        <p:nvPicPr>
+          <p:cNvPr id="2050" name="Picture 2" descr="C:\Uni\WS1920\StatPrakt\LVS\Plots\Szenarienvergleich_einfach.png"/>
+          <p:cNvPicPr>
+            <a:picLocks noChangeAspect="1" noChangeArrowheads="1"/>
+          </p:cNvPicPr>
+          <p:nvPr/>
+        </p:nvPicPr>
+        <p:blipFill>
+          <a:blip r:embed="rId2" cstate="print">
+            <a:extLst>
+              <a:ext uri="{28A0092B-C50C-407E-A947-70E740481C1C}">
+                <a14:useLocalDpi xmlns:a14="http://schemas.microsoft.com/office/drawing/2010/main" val="0"/>
+              </a:ext>
+            </a:extLst>
+          </a:blip>
+          <a:srcRect/>
+          <a:stretch>
+            <a:fillRect/>
+          </a:stretch>
+        </p:blipFill>
+        <p:spPr bwMode="auto">
+          <a:xfrm>
+            <a:off x="1187624" y="1497729"/>
+            <a:ext cx="7128792" cy="5191848"/>
+          </a:xfrm>
+          <a:prstGeom prst="rect">
+            <a:avLst/>
+          </a:prstGeom>
+          <a:noFill/>
+          <a:extLst>
+            <a:ext uri="{909E8E84-426E-40DD-AFC4-6F175D3DCCD1}">
+              <a14:hiddenFill xmlns:a14="http://schemas.microsoft.com/office/drawing/2010/main">
+                <a:solidFill>
+                  <a:srgbClr val="FFFFFF"/>
+                </a:solidFill>
+              </a14:hiddenFill>
+            </a:ext>
+          </a:extLst>
+        </p:spPr>
+      </p:pic>
+      <p:sp>
+        <p:nvSpPr>
+          <p:cNvPr id="2" name="Titel 1"/>
+          <p:cNvSpPr>
+            <a:spLocks noGrp="1"/>
+          </p:cNvSpPr>
+          <p:nvPr>
+            <p:ph type="title"/>
+          </p:nvPr>
+        </p:nvSpPr>
+        <p:spPr/>
+        <p:txBody>
+          <a:bodyPr>
+            <a:normAutofit/>
+          </a:bodyPr>
+          <a:lstStyle/>
+          <a:p>
+            <a:r>
+              <a:rPr lang="de-DE" dirty="0" smtClean="0"/>
+              <a:t>Vergleich Original und Szenario 1</a:t>
+            </a:r>
+            <a:endParaRPr lang="de-DE" dirty="0"/>
+          </a:p>
+        </p:txBody>
+      </p:sp>
+    </p:spTree>
+    <p:extLst>
+      <p:ext uri="{BB962C8B-B14F-4D97-AF65-F5344CB8AC3E}">
+        <p14:creationId xmlns:p14="http://schemas.microsoft.com/office/powerpoint/2010/main" val="1745839148"/>
+      </p:ext>
+    </p:extLst>
+  </p:cSld>
+  <p:clrMapOvr>
+    <a:masterClrMapping/>
+  </p:clrMapOvr>
+</p:sld>
+</file>
+
+<file path=ppt/slides/slide7.xml><?xml version="1.0" encoding="utf-8"?>
+<p:sld xmlns:a="http://schemas.openxmlformats.org/drawingml/2006/main" xmlns:r="http://schemas.openxmlformats.org/officeDocument/2006/relationships" xmlns:p="http://schemas.openxmlformats.org/presentationml/2006/main">
+  <p:cSld>
+    <p:spTree>
+      <p:nvGrpSpPr>
+        <p:cNvPr id="1" name=""/>
+        <p:cNvGrpSpPr/>
+        <p:nvPr/>
+      </p:nvGrpSpPr>
+      <p:grpSpPr>
+        <a:xfrm>
+          <a:off x="0" y="0"/>
+          <a:ext cx="0" cy="0"/>
+          <a:chOff x="0" y="0"/>
+          <a:chExt cx="0" cy="0"/>
+        </a:xfrm>
+      </p:grpSpPr>
+      <p:sp>
+        <p:nvSpPr>
+          <p:cNvPr id="3" name="Inhaltsplatzhalter 2"/>
+          <p:cNvSpPr>
+            <a:spLocks noGrp="1"/>
+          </p:cNvSpPr>
+          <p:nvPr>
+            <p:ph idx="1"/>
+          </p:nvPr>
+        </p:nvSpPr>
+        <p:spPr/>
+        <p:txBody>
+          <a:bodyPr/>
+          <a:lstStyle/>
+          <a:p>
+            <a:r>
+              <a:rPr lang="de-DE" dirty="0" smtClean="0"/>
+              <a:t>Da nur Infrarotmessungen hinzugefügt, befinden sich die erwarteten Anteile je Szenario konstant unter originalen Werten</a:t>
+            </a:r>
+          </a:p>
+          <a:p>
+            <a:r>
+              <a:rPr lang="de-DE" dirty="0" smtClean="0"/>
+              <a:t>Verlauf der Kurven sehr ähnlich</a:t>
+            </a:r>
+          </a:p>
+          <a:p>
+            <a:endParaRPr lang="de-DE" dirty="0" smtClean="0"/>
+          </a:p>
+          <a:p>
+            <a:r>
+              <a:rPr lang="de-DE" dirty="0" smtClean="0"/>
+              <a:t>Gilt auch für die anderen Szenarien</a:t>
+            </a:r>
+            <a:endParaRPr lang="de-DE" dirty="0"/>
+          </a:p>
+        </p:txBody>
+      </p:sp>
+    </p:spTree>
+    <p:extLst>
+      <p:ext uri="{BB962C8B-B14F-4D97-AF65-F5344CB8AC3E}">
+        <p14:creationId xmlns:p14="http://schemas.microsoft.com/office/powerpoint/2010/main" val="4113603225"/>
+      </p:ext>
+    </p:extLst>
+  </p:cSld>
+  <p:clrMapOvr>
+    <a:masterClrMapping/>
+  </p:clrMapOvr>
+</p:sld>
+</file>
+
+<file path=ppt/slides/slide8.xml><?xml version="1.0" encoding="utf-8"?>
+<p:sld xmlns:a="http://schemas.openxmlformats.org/drawingml/2006/main" xmlns:r="http://schemas.openxmlformats.org/officeDocument/2006/relationships" xmlns:p="http://schemas.openxmlformats.org/presentationml/2006/main">
+  <p:cSld>
+    <p:spTree>
+      <p:nvGrpSpPr>
+        <p:cNvPr id="1" name=""/>
+        <p:cNvGrpSpPr/>
+        <p:nvPr/>
+      </p:nvGrpSpPr>
+      <p:grpSpPr>
+        <a:xfrm>
+          <a:off x="0" y="0"/>
+          <a:ext cx="0" cy="0"/>
+          <a:chOff x="0" y="0"/>
+          <a:chExt cx="0" cy="0"/>
+        </a:xfrm>
+      </p:grpSpPr>
       <p:sp>
         <p:nvSpPr>
           <p:cNvPr id="2" name="Titel 1"/>
@@ -3709,7 +3909,11 @@
           <a:p>
             <a:r>
               <a:rPr lang="de-DE" dirty="0" smtClean="0"/>
-              <a:t>Tabelle für Signifikanzen</a:t>
+              <a:t>Vergleich für alle Szenarien</a:t>
+            </a:r>
+            <a:r>
+              <a:rPr lang="de-DE" dirty="0" smtClean="0"/>
+              <a:t/>
             </a:r>
             <a:br>
               <a:rPr lang="de-DE" dirty="0" smtClean="0"/>
@@ -3718,31 +3922,47 @@
           </a:p>
         </p:txBody>
       </p:sp>
-      <p:sp>
-        <p:nvSpPr>
-          <p:cNvPr id="3" name="Inhaltsplatzhalter 2"/>
-          <p:cNvSpPr>
-            <a:spLocks noGrp="1"/>
-          </p:cNvSpPr>
-          <p:nvPr>
-            <p:ph idx="1"/>
-          </p:nvPr>
-        </p:nvSpPr>
-        <p:spPr/>
-        <p:txBody>
-          <a:bodyPr/>
-          <a:lstStyle/>
-          <a:p>
-            <a:r>
-              <a:rPr lang="de-DE" dirty="0" smtClean="0"/>
-              <a:t>Noch einzufügen</a:t>
-            </a:r>
-          </a:p>
-          <a:p>
-            <a:endParaRPr lang="de-DE" dirty="0"/>
-          </a:p>
-        </p:txBody>
-      </p:sp>
+      <p:pic>
+        <p:nvPicPr>
+          <p:cNvPr id="1026" name="Picture 2" descr="C:\Uni\WS1920\StatPrakt\LVS\Plots\Szenarienvergleich.png"/>
+          <p:cNvPicPr>
+            <a:picLocks noChangeAspect="1" noChangeArrowheads="1"/>
+          </p:cNvPicPr>
+          <p:nvPr/>
+        </p:nvPicPr>
+        <p:blipFill>
+          <a:blip r:embed="rId2" cstate="print">
+            <a:extLst>
+              <a:ext uri="{28A0092B-C50C-407E-A947-70E740481C1C}">
+                <a14:useLocalDpi xmlns:a14="http://schemas.microsoft.com/office/drawing/2010/main" val="0"/>
+              </a:ext>
+            </a:extLst>
+          </a:blip>
+          <a:srcRect/>
+          <a:stretch>
+            <a:fillRect/>
+          </a:stretch>
+        </p:blipFill>
+        <p:spPr bwMode="auto">
+          <a:xfrm>
+            <a:off x="683568" y="1064170"/>
+            <a:ext cx="7955357" cy="5793830"/>
+          </a:xfrm>
+          <a:prstGeom prst="rect">
+            <a:avLst/>
+          </a:prstGeom>
+          <a:noFill/>
+          <a:extLst>
+            <a:ext uri="{909E8E84-426E-40DD-AFC4-6F175D3DCCD1}">
+              <a14:hiddenFill xmlns:a14="http://schemas.microsoft.com/office/drawing/2010/main">
+                <a:solidFill>
+                  <a:srgbClr val="FFFFFF"/>
+                </a:solidFill>
+              </a14:hiddenFill>
+            </a:ext>
+          </a:extLst>
+        </p:spPr>
+      </p:pic>
     </p:spTree>
     <p:extLst>
       <p:ext uri="{BB962C8B-B14F-4D97-AF65-F5344CB8AC3E}">
@@ -3763,7 +3983,7 @@
 </p:sld>
 </file>
 
-<file path=ppt/slides/slide7.xml><?xml version="1.0" encoding="utf-8"?>
+<file path=ppt/slides/slide9.xml><?xml version="1.0" encoding="utf-8"?>
 <p:sld xmlns:a="http://schemas.openxmlformats.org/drawingml/2006/main" xmlns:r="http://schemas.openxmlformats.org/officeDocument/2006/relationships" xmlns:p="http://schemas.openxmlformats.org/presentationml/2006/main">
   <p:cSld>
     <p:spTree>
@@ -3780,64 +4000,51 @@
           <a:chExt cx="0" cy="0"/>
         </a:xfrm>
       </p:grpSpPr>
-      <p:pic>
-        <p:nvPicPr>
-          <p:cNvPr id="4098" name="Picture 2" descr="C:\Uni\WS1920\StatPrakt\LVS\Plots\Szenarien_date_model.png"/>
-          <p:cNvPicPr>
-            <a:picLocks noChangeAspect="1" noChangeArrowheads="1"/>
-          </p:cNvPicPr>
-          <p:nvPr/>
-        </p:nvPicPr>
-        <p:blipFill>
-          <a:blip r:embed="rId2" cstate="print">
-            <a:extLst>
-              <a:ext uri="{28A0092B-C50C-407E-A947-70E740481C1C}">
-                <a14:useLocalDpi xmlns:a14="http://schemas.microsoft.com/office/drawing/2010/main" val="0"/>
-              </a:ext>
-            </a:extLst>
-          </a:blip>
-          <a:srcRect/>
-          <a:stretch>
-            <a:fillRect/>
-          </a:stretch>
-        </p:blipFill>
-        <p:spPr bwMode="auto">
-          <a:xfrm>
-            <a:off x="395536" y="404664"/>
-            <a:ext cx="8339488" cy="6048672"/>
-          </a:xfrm>
-          <a:prstGeom prst="rect">
-            <a:avLst/>
-          </a:prstGeom>
-          <a:noFill/>
-          <a:extLst>
-            <a:ext uri="{909E8E84-426E-40DD-AFC4-6F175D3DCCD1}">
-              <a14:hiddenFill xmlns:a14="http://schemas.microsoft.com/office/drawing/2010/main">
-                <a:solidFill>
-                  <a:srgbClr val="FFFFFF"/>
-                </a:solidFill>
-              </a14:hiddenFill>
-            </a:ext>
-          </a:extLst>
-        </p:spPr>
-      </p:pic>
+      <p:sp>
+        <p:nvSpPr>
+          <p:cNvPr id="3" name="Inhaltsplatzhalter 2"/>
+          <p:cNvSpPr>
+            <a:spLocks noGrp="1"/>
+          </p:cNvSpPr>
+          <p:nvPr>
+            <p:ph idx="1"/>
+          </p:nvPr>
+        </p:nvSpPr>
+        <p:spPr/>
+        <p:txBody>
+          <a:bodyPr/>
+          <a:lstStyle/>
+          <a:p>
+            <a:r>
+              <a:rPr lang="de-DE" dirty="0" smtClean="0"/>
+              <a:t>Für die generelle Unterschätzung wurden 25% neue Beobachtungen hinzugefügt</a:t>
+            </a:r>
+          </a:p>
+          <a:p>
+            <a:r>
+              <a:rPr lang="de-DE" dirty="0" smtClean="0"/>
+              <a:t>-&gt; Wie ändern sich die Ergebnisse bei unterschiedlichen Werten?</a:t>
+            </a:r>
+          </a:p>
+          <a:p>
+            <a:r>
+              <a:rPr lang="de-DE" dirty="0" smtClean="0"/>
+              <a:t>Auch da Verläufe sehr ähnlich</a:t>
+            </a:r>
+            <a:endParaRPr lang="de-DE" dirty="0"/>
+          </a:p>
+        </p:txBody>
+      </p:sp>
     </p:spTree>
     <p:extLst>
       <p:ext uri="{BB962C8B-B14F-4D97-AF65-F5344CB8AC3E}">
-        <p14:creationId xmlns:p14="http://schemas.microsoft.com/office/powerpoint/2010/main" val="670619769"/>
+        <p14:creationId xmlns:p14="http://schemas.microsoft.com/office/powerpoint/2010/main" val="3875737280"/>
       </p:ext>
     </p:extLst>
   </p:cSld>
   <p:clrMapOvr>
     <a:masterClrMapping/>
   </p:clrMapOvr>
-  <p:timing>
-    <p:tnLst>
-      <p:par>
-        <p:cTn id="1" dur="indefinite" restart="never" nodeType="tmRoot"/>
-      </p:par>
-    </p:tnLst>
-  </p:timing>
 </p:sld>
 </file>
 

</xml_diff>